<commit_message>
Yoko Noise Measurement + Presentation Update
</commit_message>
<xml_diff>
--- a/Performance Measure/Noise/Presentations/20220725_Subgroup Meeting.pptx
+++ b/Performance Measure/Noise/Presentations/20220725_Subgroup Meeting.pptx
@@ -5,7 +5,7 @@
     <p:sldMasterId id="2147483648" r:id="rId1"/>
   </p:sldMasterIdLst>
   <p:notesMasterIdLst>
-    <p:notesMasterId r:id="rId16"/>
+    <p:notesMasterId r:id="rId19"/>
   </p:notesMasterIdLst>
   <p:sldIdLst>
     <p:sldId id="256" r:id="rId2"/>
@@ -22,6 +22,9 @@
     <p:sldId id="267" r:id="rId13"/>
     <p:sldId id="265" r:id="rId14"/>
     <p:sldId id="266" r:id="rId15"/>
+    <p:sldId id="272" r:id="rId16"/>
+    <p:sldId id="270" r:id="rId17"/>
+    <p:sldId id="271" r:id="rId18"/>
   </p:sldIdLst>
   <p:sldSz cx="12192000" cy="6858000"/>
   <p:notesSz cx="6858000" cy="9144000"/>
@@ -506,7 +509,7 @@
           <a:p>
             <a:fld id="{22CDD584-1A2D-2C47-B963-7113CB684ECB}" type="datetimeFigureOut">
               <a:rPr lang="en-US" smtClean="0"/>
-              <a:t>7/26/22</a:t>
+              <a:t>7/27/2022</a:t>
             </a:fld>
             <a:endParaRPr lang="en-US"/>
           </a:p>
@@ -1172,7 +1175,7 @@
           <a:p>
             <a:fld id="{7A810BC3-F789-4159-984E-64DF68683882}" type="datetimeFigureOut">
               <a:rPr lang="en-US" smtClean="0"/>
-              <a:t>7/26/22</a:t>
+              <a:t>7/27/2022</a:t>
             </a:fld>
             <a:endParaRPr lang="en-US"/>
           </a:p>
@@ -1370,7 +1373,7 @@
           <a:p>
             <a:fld id="{7A810BC3-F789-4159-984E-64DF68683882}" type="datetimeFigureOut">
               <a:rPr lang="en-US" smtClean="0"/>
-              <a:t>7/26/22</a:t>
+              <a:t>7/27/2022</a:t>
             </a:fld>
             <a:endParaRPr lang="en-US"/>
           </a:p>
@@ -1578,7 +1581,7 @@
           <a:p>
             <a:fld id="{7A810BC3-F789-4159-984E-64DF68683882}" type="datetimeFigureOut">
               <a:rPr lang="en-US" smtClean="0"/>
-              <a:t>7/26/22</a:t>
+              <a:t>7/27/2022</a:t>
             </a:fld>
             <a:endParaRPr lang="en-US"/>
           </a:p>
@@ -1776,7 +1779,7 @@
           <a:p>
             <a:fld id="{7A810BC3-F789-4159-984E-64DF68683882}" type="datetimeFigureOut">
               <a:rPr lang="en-US" smtClean="0"/>
-              <a:t>7/26/22</a:t>
+              <a:t>7/27/2022</a:t>
             </a:fld>
             <a:endParaRPr lang="en-US"/>
           </a:p>
@@ -2051,7 +2054,7 @@
           <a:p>
             <a:fld id="{7A810BC3-F789-4159-984E-64DF68683882}" type="datetimeFigureOut">
               <a:rPr lang="en-US" smtClean="0"/>
-              <a:t>7/26/22</a:t>
+              <a:t>7/27/2022</a:t>
             </a:fld>
             <a:endParaRPr lang="en-US"/>
           </a:p>
@@ -2316,7 +2319,7 @@
           <a:p>
             <a:fld id="{7A810BC3-F789-4159-984E-64DF68683882}" type="datetimeFigureOut">
               <a:rPr lang="en-US" smtClean="0"/>
-              <a:t>7/26/22</a:t>
+              <a:t>7/27/2022</a:t>
             </a:fld>
             <a:endParaRPr lang="en-US"/>
           </a:p>
@@ -2728,7 +2731,7 @@
           <a:p>
             <a:fld id="{7A810BC3-F789-4159-984E-64DF68683882}" type="datetimeFigureOut">
               <a:rPr lang="en-US" smtClean="0"/>
-              <a:t>7/26/22</a:t>
+              <a:t>7/27/2022</a:t>
             </a:fld>
             <a:endParaRPr lang="en-US"/>
           </a:p>
@@ -2869,7 +2872,7 @@
           <a:p>
             <a:fld id="{7A810BC3-F789-4159-984E-64DF68683882}" type="datetimeFigureOut">
               <a:rPr lang="en-US" smtClean="0"/>
-              <a:t>7/26/22</a:t>
+              <a:t>7/27/2022</a:t>
             </a:fld>
             <a:endParaRPr lang="en-US"/>
           </a:p>
@@ -2982,7 +2985,7 @@
           <a:p>
             <a:fld id="{7A810BC3-F789-4159-984E-64DF68683882}" type="datetimeFigureOut">
               <a:rPr lang="en-US" smtClean="0"/>
-              <a:t>7/26/22</a:t>
+              <a:t>7/27/2022</a:t>
             </a:fld>
             <a:endParaRPr lang="en-US"/>
           </a:p>
@@ -3293,7 +3296,7 @@
           <a:p>
             <a:fld id="{7A810BC3-F789-4159-984E-64DF68683882}" type="datetimeFigureOut">
               <a:rPr lang="en-US" smtClean="0"/>
-              <a:t>7/26/22</a:t>
+              <a:t>7/27/2022</a:t>
             </a:fld>
             <a:endParaRPr lang="en-US"/>
           </a:p>
@@ -3581,7 +3584,7 @@
           <a:p>
             <a:fld id="{7A810BC3-F789-4159-984E-64DF68683882}" type="datetimeFigureOut">
               <a:rPr lang="en-US" smtClean="0"/>
-              <a:t>7/26/22</a:t>
+              <a:t>7/27/2022</a:t>
             </a:fld>
             <a:endParaRPr lang="en-US"/>
           </a:p>
@@ -3822,7 +3825,7 @@
           <a:p>
             <a:fld id="{7A810BC3-F789-4159-984E-64DF68683882}" type="datetimeFigureOut">
               <a:rPr lang="en-US" smtClean="0"/>
-              <a:t>7/26/22</a:t>
+              <a:t>7/27/2022</a:t>
             </a:fld>
             <a:endParaRPr lang="en-US"/>
           </a:p>
@@ -4324,10 +4327,10 @@
       </p:grpSpPr>
       <p:pic>
         <p:nvPicPr>
-          <p:cNvPr id="3" name="Picture 2" descr="A picture containing diagram&#10;&#10;Description automatically generated">
-            <a:extLst>
-              <a:ext uri="{FF2B5EF4-FFF2-40B4-BE49-F238E27FC236}">
-                <a16:creationId xmlns:a16="http://schemas.microsoft.com/office/drawing/2014/main" id="{4FFC3F93-2923-C978-86CC-8996B92C2768}"/>
+          <p:cNvPr id="4" name="Picture 3" descr="A picture containing diagram&#10;&#10;Description automatically generated">
+            <a:extLst>
+              <a:ext uri="{FF2B5EF4-FFF2-40B4-BE49-F238E27FC236}">
+                <a16:creationId xmlns:a16="http://schemas.microsoft.com/office/drawing/2014/main" id="{9122D95B-9D67-3B8C-3DE0-58667C7F3B52}"/>
               </a:ext>
             </a:extLst>
           </p:cNvPr>
@@ -4350,7 +4353,7 @@
         </p:blipFill>
         <p:spPr>
           <a:xfrm>
-            <a:off x="0" y="387639"/>
+            <a:off x="0" y="396875"/>
             <a:ext cx="12192000" cy="6064250"/>
           </a:xfrm>
           <a:prstGeom prst="rect">
@@ -4395,10 +4398,10 @@
       </p:grpSpPr>
       <p:pic>
         <p:nvPicPr>
-          <p:cNvPr id="3" name="Picture 2" descr="A picture containing schematic&#10;&#10;Description automatically generated">
-            <a:extLst>
-              <a:ext uri="{FF2B5EF4-FFF2-40B4-BE49-F238E27FC236}">
-                <a16:creationId xmlns:a16="http://schemas.microsoft.com/office/drawing/2014/main" id="{6ACA21A0-7F56-5AAC-2924-BB06FCE89211}"/>
+          <p:cNvPr id="4" name="Picture 3" descr="A picture containing schematic&#10;&#10;Description automatically generated">
+            <a:extLst>
+              <a:ext uri="{FF2B5EF4-FFF2-40B4-BE49-F238E27FC236}">
+                <a16:creationId xmlns:a16="http://schemas.microsoft.com/office/drawing/2014/main" id="{C9FF82C6-9737-923B-DE7B-6C8157AE1C62}"/>
               </a:ext>
             </a:extLst>
           </p:cNvPr>
@@ -4466,10 +4469,10 @@
       </p:grpSpPr>
       <p:pic>
         <p:nvPicPr>
-          <p:cNvPr id="7" name="Picture 6" descr="Text&#10;&#10;Description automatically generated">
-            <a:extLst>
-              <a:ext uri="{FF2B5EF4-FFF2-40B4-BE49-F238E27FC236}">
-                <a16:creationId xmlns:a16="http://schemas.microsoft.com/office/drawing/2014/main" id="{A987A682-E823-C606-7056-E0603800BD2B}"/>
+          <p:cNvPr id="3" name="Picture 2" descr="Text&#10;&#10;Description automatically generated">
+            <a:extLst>
+              <a:ext uri="{FF2B5EF4-FFF2-40B4-BE49-F238E27FC236}">
+                <a16:creationId xmlns:a16="http://schemas.microsoft.com/office/drawing/2014/main" id="{5D39CF8E-F938-3A13-A64F-6174F03A4F45}"/>
               </a:ext>
             </a:extLst>
           </p:cNvPr>
@@ -4657,6 +4660,168 @@
       <p188:commentRel xmlns:p188="http://schemas.microsoft.com/office/powerpoint/2018/8/main" r:id="rId2"/>
     </p:ext>
   </p:extLst>
+</p:sld>
+</file>
+
+<file path=ppt/slides/slide15.xml><?xml version="1.0" encoding="utf-8"?>
+<p:sld xmlns:a="http://schemas.openxmlformats.org/drawingml/2006/main" xmlns:r="http://schemas.openxmlformats.org/officeDocument/2006/relationships" xmlns:p="http://schemas.openxmlformats.org/presentationml/2006/main">
+  <p:cSld>
+    <p:spTree>
+      <p:nvGrpSpPr>
+        <p:cNvPr id="1" name=""/>
+        <p:cNvGrpSpPr/>
+        <p:nvPr/>
+      </p:nvGrpSpPr>
+      <p:grpSpPr>
+        <a:xfrm>
+          <a:off x="0" y="0"/>
+          <a:ext cx="0" cy="0"/>
+          <a:chOff x="0" y="0"/>
+          <a:chExt cx="0" cy="0"/>
+        </a:xfrm>
+      </p:grpSpPr>
+    </p:spTree>
+    <p:extLst>
+      <p:ext uri="{BB962C8B-B14F-4D97-AF65-F5344CB8AC3E}">
+        <p14:creationId xmlns:p14="http://schemas.microsoft.com/office/powerpoint/2010/main" val="3574374848"/>
+      </p:ext>
+    </p:extLst>
+  </p:cSld>
+  <p:clrMapOvr>
+    <a:masterClrMapping/>
+  </p:clrMapOvr>
+</p:sld>
+</file>
+
+<file path=ppt/slides/slide16.xml><?xml version="1.0" encoding="utf-8"?>
+<p:sld xmlns:a="http://schemas.openxmlformats.org/drawingml/2006/main" xmlns:r="http://schemas.openxmlformats.org/officeDocument/2006/relationships" xmlns:p="http://schemas.openxmlformats.org/presentationml/2006/main">
+  <p:cSld>
+    <p:spTree>
+      <p:nvGrpSpPr>
+        <p:cNvPr id="1" name=""/>
+        <p:cNvGrpSpPr/>
+        <p:nvPr/>
+      </p:nvGrpSpPr>
+      <p:grpSpPr>
+        <a:xfrm>
+          <a:off x="0" y="0"/>
+          <a:ext cx="0" cy="0"/>
+          <a:chOff x="0" y="0"/>
+          <a:chExt cx="0" cy="0"/>
+        </a:xfrm>
+      </p:grpSpPr>
+      <p:pic>
+        <p:nvPicPr>
+          <p:cNvPr id="3" name="Picture 2" descr="A picture containing chart&#10;&#10;Description automatically generated">
+            <a:extLst>
+              <a:ext uri="{FF2B5EF4-FFF2-40B4-BE49-F238E27FC236}">
+                <a16:creationId xmlns:a16="http://schemas.microsoft.com/office/drawing/2014/main" id="{3B721A7C-EBD5-C59A-9C40-0A8E07945B13}"/>
+              </a:ext>
+            </a:extLst>
+          </p:cNvPr>
+          <p:cNvPicPr>
+            <a:picLocks noChangeAspect="1"/>
+          </p:cNvPicPr>
+          <p:nvPr/>
+        </p:nvPicPr>
+        <p:blipFill>
+          <a:blip r:embed="rId2">
+            <a:extLst>
+              <a:ext uri="{28A0092B-C50C-407E-A947-70E740481C1C}">
+                <a14:useLocalDpi xmlns:a14="http://schemas.microsoft.com/office/drawing/2010/main" val="0"/>
+              </a:ext>
+            </a:extLst>
+          </a:blip>
+          <a:stretch>
+            <a:fillRect/>
+          </a:stretch>
+        </p:blipFill>
+        <p:spPr>
+          <a:xfrm>
+            <a:off x="0" y="396875"/>
+            <a:ext cx="12192000" cy="6064250"/>
+          </a:xfrm>
+          <a:prstGeom prst="rect">
+            <a:avLst/>
+          </a:prstGeom>
+        </p:spPr>
+      </p:pic>
+    </p:spTree>
+    <p:extLst>
+      <p:ext uri="{BB962C8B-B14F-4D97-AF65-F5344CB8AC3E}">
+        <p14:creationId xmlns:p14="http://schemas.microsoft.com/office/powerpoint/2010/main" val="133792469"/>
+      </p:ext>
+    </p:extLst>
+  </p:cSld>
+  <p:clrMapOvr>
+    <a:masterClrMapping/>
+  </p:clrMapOvr>
+</p:sld>
+</file>
+
+<file path=ppt/slides/slide17.xml><?xml version="1.0" encoding="utf-8"?>
+<p:sld xmlns:a="http://schemas.openxmlformats.org/drawingml/2006/main" xmlns:r="http://schemas.openxmlformats.org/officeDocument/2006/relationships" xmlns:p="http://schemas.openxmlformats.org/presentationml/2006/main">
+  <p:cSld>
+    <p:spTree>
+      <p:nvGrpSpPr>
+        <p:cNvPr id="1" name=""/>
+        <p:cNvGrpSpPr/>
+        <p:nvPr/>
+      </p:nvGrpSpPr>
+      <p:grpSpPr>
+        <a:xfrm>
+          <a:off x="0" y="0"/>
+          <a:ext cx="0" cy="0"/>
+          <a:chOff x="0" y="0"/>
+          <a:chExt cx="0" cy="0"/>
+        </a:xfrm>
+      </p:grpSpPr>
+      <p:pic>
+        <p:nvPicPr>
+          <p:cNvPr id="3" name="Picture 2" descr="A picture containing diagram&#10;&#10;Description automatically generated">
+            <a:extLst>
+              <a:ext uri="{FF2B5EF4-FFF2-40B4-BE49-F238E27FC236}">
+                <a16:creationId xmlns:a16="http://schemas.microsoft.com/office/drawing/2014/main" id="{E8BBA182-3DD4-6B31-EBE4-9063335A10A3}"/>
+              </a:ext>
+            </a:extLst>
+          </p:cNvPr>
+          <p:cNvPicPr>
+            <a:picLocks noChangeAspect="1"/>
+          </p:cNvPicPr>
+          <p:nvPr/>
+        </p:nvPicPr>
+        <p:blipFill>
+          <a:blip r:embed="rId2">
+            <a:extLst>
+              <a:ext uri="{28A0092B-C50C-407E-A947-70E740481C1C}">
+                <a14:useLocalDpi xmlns:a14="http://schemas.microsoft.com/office/drawing/2010/main" val="0"/>
+              </a:ext>
+            </a:extLst>
+          </a:blip>
+          <a:stretch>
+            <a:fillRect/>
+          </a:stretch>
+        </p:blipFill>
+        <p:spPr>
+          <a:xfrm>
+            <a:off x="0" y="396875"/>
+            <a:ext cx="12192000" cy="6064250"/>
+          </a:xfrm>
+          <a:prstGeom prst="rect">
+            <a:avLst/>
+          </a:prstGeom>
+        </p:spPr>
+      </p:pic>
+    </p:spTree>
+    <p:extLst>
+      <p:ext uri="{BB962C8B-B14F-4D97-AF65-F5344CB8AC3E}">
+        <p14:creationId xmlns:p14="http://schemas.microsoft.com/office/powerpoint/2010/main" val="2303639888"/>
+      </p:ext>
+    </p:extLst>
+  </p:cSld>
+  <p:clrMapOvr>
+    <a:masterClrMapping/>
+  </p:clrMapOvr>
 </p:sld>
 </file>
 

</xml_diff>